<commit_message>
Prefab System Tutorial Renewal
- Each PPT Data update

- Implementation of a system that
  creates game objects in the form of
  prefab

- Implementation of a system that
  can save when changes are made
  to a prefab

- Implementing a system that breaks
  prefab properties
</commit_message>
<xml_diff>
--- a/Assets/Prefab System/PPT Data/Prefab System Example.pptx
+++ b/Assets/Prefab System/PPT Data/Prefab System Example.pptx
@@ -2,7 +2,7 @@
 <file path=ppt/presentation.xml><?xml version="1.0" encoding="utf-8"?>
 <p:presentation xmlns:a="http://schemas.openxmlformats.org/drawingml/2006/main" xmlns:r="http://schemas.openxmlformats.org/officeDocument/2006/relationships" xmlns:p="http://schemas.openxmlformats.org/presentationml/2006/main" xmlns:p14="http://schemas.microsoft.com/office/powerpoint/2010/main" saveSubsetFonts="1" firstSlideNum="0">
   <p:sldMasterIdLst>
-    <p:sldMasterId id="2147485567" r:id="rId12"/>
+    <p:sldMasterId id="2147485571" r:id="rId12"/>
   </p:sldMasterIdLst>
   <p:notesMasterIdLst>
     <p:notesMasterId r:id="rId14"/>
@@ -5604,7 +5604,7 @@
         <p:spPr>
           <a:xfrm rot="0">
             <a:off x="6795135" y="3225165"/>
-            <a:ext cx="4152900" cy="677545"/>
+            <a:ext cx="4153535" cy="678180"/>
           </a:xfrm>
           <a:prstGeom prst="rect"/>
           <a:noFill/>
@@ -5648,35 +5648,7 @@
                 <a:latin typeface="맑은 고딕" charset="0"/>
                 <a:ea typeface="맑은 고딕" charset="0"/>
               </a:rPr>
-              <a:t> 이제 P</a:t>
-            </a:r>
-            <a:r>
-              <a:rPr lang="ko-KR" sz="1800">
-                <a:latin typeface="맑은 고딕" charset="0"/>
-                <a:ea typeface="맑은 고딕" charset="0"/>
-              </a:rPr>
-              <a:t>r</a:t>
-            </a:r>
-            <a:r>
-              <a:rPr lang="ko-KR" sz="1800">
-                <a:latin typeface="맑은 고딕" charset="0"/>
-                <a:ea typeface="맑은 고딕" charset="0"/>
-              </a:rPr>
-              <a:t>efab Object</a:t>
-            </a:r>
-            <a:r>
-              <a:rPr lang="ko-KR" sz="1800">
-                <a:latin typeface="맑은 고딕" charset="0"/>
-                <a:ea typeface="맑은 고딕" charset="0"/>
-              </a:rPr>
-              <a:t>의 </a:t>
-            </a:r>
-            <a:r>
-              <a:rPr lang="ko-KR" sz="1800">
-                <a:latin typeface="맑은 고딕" charset="0"/>
-                <a:ea typeface="맑은 고딕" charset="0"/>
-              </a:rPr>
-              <a:t>위치와 회전 값을 초기화합니다.</a:t>
+              <a:t> 이제 Prefab Object의 위치와 회전 값을 초기화합니다.</a:t>
             </a:r>
             <a:endParaRPr lang="ko-KR" altLang="en-US" sz="1800">
               <a:latin typeface="맑은 고딕" charset="0"/>
@@ -5749,7 +5721,7 @@
       </p:pic>
       <p:pic>
         <p:nvPicPr>
-          <p:cNvPr id="45" name="그림 12" descr="C:/Users/nwond/AppData/Roaming/PolarisOffice/ETemp/2436_20910960/fImage5904656334.png"/>
+          <p:cNvPr id="45" name="그림 12"/>
           <p:cNvPicPr>
             <a:picLocks noChangeAspect="1"/>
           </p:cNvPicPr>
@@ -5780,7 +5752,7 @@
       </p:pic>
       <p:pic>
         <p:nvPicPr>
-          <p:cNvPr id="46" name="그림 15" descr="C:/Users/nwond/AppData/Roaming/PolarisOffice/ETemp/2436_20910960/fImage6051666500.png"/>
+          <p:cNvPr id="46" name="그림 15"/>
           <p:cNvPicPr>
             <a:picLocks noChangeAspect="1"/>
           </p:cNvPicPr>
@@ -5811,7 +5783,7 @@
       </p:pic>
       <p:pic>
         <p:nvPicPr>
-          <p:cNvPr id="47" name="그림 18" descr="C:/Users/nwond/AppData/Roaming/PolarisOffice/ETemp/2436_20910960/fImage224217679169.png"/>
+          <p:cNvPr id="47" name="그림 18"/>
           <p:cNvPicPr>
             <a:picLocks noChangeAspect="1"/>
           </p:cNvPicPr>
@@ -5840,7 +5812,7 @@
       </p:pic>
       <p:pic>
         <p:nvPicPr>
-          <p:cNvPr id="48" name="그림 1" descr="C:/Users/nwond/AppData/Roaming/PolarisOffice/ETemp/2436_20910960/fImage126305041.png"/>
+          <p:cNvPr id="48" name="그림 1"/>
           <p:cNvPicPr>
             <a:picLocks noChangeAspect="1"/>
           </p:cNvPicPr>
@@ -6487,8 +6459,8 @@
         </p:nvSpPr>
         <p:spPr>
           <a:xfrm rot="0">
-            <a:off x="4832350" y="443865"/>
-            <a:ext cx="2517140" cy="478155"/>
+            <a:off x="4648200" y="462280"/>
+            <a:ext cx="2894330" cy="478155"/>
           </a:xfrm>
           <a:prstGeom prst="rect"/>
           <a:noFill/>
@@ -6498,7 +6470,7 @@
           </a:ln>
         </p:spPr>
         <p:txBody>
-          <a:bodyPr wrap="square" lIns="89535" tIns="46355" rIns="89535" bIns="46355" vert="horz" anchor="t">
+          <a:bodyPr wrap="square" lIns="89535" tIns="46355" rIns="89535" bIns="46355" numCol="1" vert="horz" anchor="t">
             <a:spAutoFit/>
           </a:bodyPr>
           <a:lstStyle/>
@@ -6742,7 +6714,7 @@
       </p:sp>
       <p:pic>
         <p:nvPicPr>
-          <p:cNvPr id="6" name="그림 5" descr="C:/Users/nwond/AppData/Roaming/PolarisOffice/ETemp/2436_20910960/fImage50409605724.png"/>
+          <p:cNvPr id="6" name="그림 5"/>
           <p:cNvPicPr>
             <a:picLocks noChangeAspect="1"/>
           </p:cNvPicPr>
@@ -6928,7 +6900,7 @@
       </p:sp>
       <p:pic>
         <p:nvPicPr>
-          <p:cNvPr id="8" name="그림 20" descr="C:/Users/nwond/AppData/Roaming/PolarisOffice/ETemp/2436_20910960/fImage8289635724.png"/>
+          <p:cNvPr id="8" name="그림 20"/>
           <p:cNvPicPr>
             <a:picLocks noChangeAspect="1"/>
           </p:cNvPicPr>
@@ -6959,7 +6931,7 @@
       </p:pic>
       <p:pic>
         <p:nvPicPr>
-          <p:cNvPr id="11" name="그림 27" descr="C:/Users/nwond/AppData/Roaming/PolarisOffice/ETemp/2436_20910960/fImage26771541478.png"/>
+          <p:cNvPr id="11" name="그림 27"/>
           <p:cNvPicPr>
             <a:picLocks noChangeAspect="1"/>
           </p:cNvPicPr>
@@ -6990,7 +6962,7 @@
       </p:pic>
       <p:pic>
         <p:nvPicPr>
-          <p:cNvPr id="10" name="그림 22" descr="C:/Users/nwond/AppData/Roaming/PolarisOffice/ETemp/2436_20910960/fImage224217659358.png"/>
+          <p:cNvPr id="10" name="그림 22"/>
           <p:cNvPicPr>
             <a:picLocks noChangeAspect="1"/>
           </p:cNvPicPr>
@@ -7041,7 +7013,7 @@
 </file>
 
 <file path=ppt/slides/slide4.xml><?xml version="1.0" encoding="utf-8"?>
-<p:sld xmlns:a="http://schemas.openxmlformats.org/drawingml/2006/main" xmlns:r="http://schemas.openxmlformats.org/officeDocument/2006/relationships" xmlns:p="http://schemas.openxmlformats.org/presentationml/2006/main">
+<p:sld xmlns:a="http://schemas.openxmlformats.org/drawingml/2006/main" xmlns:r="http://schemas.openxmlformats.org/officeDocument/2006/relationships" xmlns:p="http://schemas.openxmlformats.org/presentationml/2006/main" xmlns:p14="http://schemas.microsoft.com/office/powerpoint/2010/main">
   <p:cSld>
     <p:spTree>
       <p:nvGrpSpPr>
@@ -7067,8 +7039,8 @@
         </p:nvSpPr>
         <p:spPr>
           <a:xfrm rot="0">
-            <a:off x="4832350" y="443865"/>
-            <a:ext cx="2517775" cy="478155"/>
+            <a:off x="4567555" y="456565"/>
+            <a:ext cx="3056255" cy="478155"/>
           </a:xfrm>
           <a:prstGeom prst="rect"/>
           <a:noFill/>
@@ -7095,27 +7067,7 @@
                 <a:latin typeface="나눔바른고딕" charset="0"/>
                 <a:ea typeface="나눔바른고딕" charset="0"/>
               </a:rPr>
-              <a:t>네</a:t>
-            </a:r>
-            <a:r>
-              <a:rPr sz="2500" b="1">
-                <a:solidFill>
-                  <a:schemeClr val="tx1"/>
-                </a:solidFill>
-                <a:latin typeface="나눔바른고딕" charset="0"/>
-                <a:ea typeface="나눔바른고딕" charset="0"/>
-              </a:rPr>
-              <a:t> </a:t>
-            </a:r>
-            <a:r>
-              <a:rPr sz="2500" b="1">
-                <a:solidFill>
-                  <a:schemeClr val="tx1"/>
-                </a:solidFill>
-                <a:latin typeface="나눔바른고딕" charset="0"/>
-                <a:ea typeface="나눔바른고딕" charset="0"/>
-              </a:rPr>
-              <a:t>번째 </a:t>
+              <a:t>네 번째 </a:t>
             </a:r>
             <a:r>
               <a:rPr lang="ko-KR" sz="2500" b="1">
@@ -7386,7 +7338,7 @@
       </p:sp>
       <p:pic>
         <p:nvPicPr>
-          <p:cNvPr id="12" name="그림 28" descr="C:/Users/nwond/AppData/Roaming/PolarisOffice/ETemp/2436_20910960/fImage333361636962.png"/>
+          <p:cNvPr id="12" name="그림 28"/>
           <p:cNvPicPr>
             <a:picLocks noChangeAspect="1"/>
           </p:cNvPicPr>
@@ -7417,7 +7369,7 @@
       </p:pic>
       <p:pic>
         <p:nvPicPr>
-          <p:cNvPr id="13" name="그림 31" descr="C:/Users/nwond/AppData/Roaming/PolarisOffice/ETemp/2436_20910960/fImage125741644464.png"/>
+          <p:cNvPr id="13" name="그림 31"/>
           <p:cNvPicPr>
             <a:picLocks noChangeAspect="1"/>
           </p:cNvPicPr>
@@ -7540,7 +7492,7 @@
       </p:sp>
       <p:pic>
         <p:nvPicPr>
-          <p:cNvPr id="15" name="그림 35" descr="C:/Users/nwond/AppData/Roaming/PolarisOffice/ETemp/2436_20910960/fImage51331665705.png"/>
+          <p:cNvPr id="15" name="그림 35"/>
           <p:cNvPicPr>
             <a:picLocks noChangeAspect="1"/>
           </p:cNvPicPr>
@@ -8322,7 +8274,7 @@
 </file>
 
 <file path=ppt/slides/slide6.xml><?xml version="1.0" encoding="utf-8"?>
-<p:sld xmlns:a="http://schemas.openxmlformats.org/drawingml/2006/main" xmlns:r="http://schemas.openxmlformats.org/officeDocument/2006/relationships" xmlns:p="http://schemas.openxmlformats.org/presentationml/2006/main">
+<p:sld xmlns:a="http://schemas.openxmlformats.org/drawingml/2006/main" xmlns:r="http://schemas.openxmlformats.org/officeDocument/2006/relationships" xmlns:p="http://schemas.openxmlformats.org/presentationml/2006/main" xmlns:p14="http://schemas.microsoft.com/office/powerpoint/2010/main">
   <p:cSld>
     <p:spTree>
       <p:nvGrpSpPr>
@@ -8428,8 +8380,8 @@
         </p:nvSpPr>
         <p:spPr>
           <a:xfrm rot="0">
-            <a:off x="1247775" y="2658745"/>
-            <a:ext cx="4133850" cy="647065"/>
+            <a:off x="1247775" y="2916555"/>
+            <a:ext cx="4135120" cy="648335"/>
           </a:xfrm>
           <a:prstGeom prst="rect"/>
           <a:noFill/>
@@ -8480,84 +8432,7 @@
                 <a:latin typeface="맑은 고딕" charset="0"/>
                 <a:ea typeface="맑은 고딕" charset="0"/>
               </a:rPr>
-              <a:t>그다음으로 Aw</a:t>
-            </a:r>
-            <a:r>
-              <a:rPr lang="ko-KR" sz="1800">
-                <a:latin typeface="맑은 고딕" charset="0"/>
-                <a:ea typeface="맑은 고딕" charset="0"/>
-              </a:rPr>
-              <a:t>ake(</a:t>
-            </a:r>
-            <a:r>
-              <a:rPr lang="ko-KR" sz="1800">
-                <a:latin typeface="맑은 고딕" charset="0"/>
-                <a:ea typeface="맑은 고딕" charset="0"/>
-              </a:rPr>
-              <a:t> </a:t>
-            </a:r>
-            <a:r>
-              <a:rPr lang="ko-KR" sz="1800">
-                <a:latin typeface="맑은 고딕" charset="0"/>
-                <a:ea typeface="맑은 고딕" charset="0"/>
-              </a:rPr>
-              <a:t>)</a:t>
-            </a:r>
-            <a:r>
-              <a:rPr lang="ko-KR" sz="1800">
-                <a:latin typeface="맑은 고딕" charset="0"/>
-                <a:ea typeface="맑은 고딕" charset="0"/>
-              </a:rPr>
-              <a:t> 함수에서 S</a:t>
-            </a:r>
-            <a:r>
-              <a:rPr lang="ko-KR" sz="1800">
-                <a:latin typeface="맑은 고딕" charset="0"/>
-                <a:ea typeface="맑은 고딕" charset="0"/>
-              </a:rPr>
-              <a:t>etM</a:t>
-            </a:r>
-            <a:r>
-              <a:rPr lang="ko-KR" sz="1800">
-                <a:latin typeface="맑은 고딕" charset="0"/>
-                <a:ea typeface="맑은 고딕" charset="0"/>
-              </a:rPr>
-              <a:t>o</a:t>
-            </a:r>
-            <a:r>
-              <a:rPr lang="ko-KR" sz="1800">
-                <a:latin typeface="맑은 고딕" charset="0"/>
-                <a:ea typeface="맑은 고딕" charset="0"/>
-              </a:rPr>
-              <a:t>use(</a:t>
-            </a:r>
-            <a:r>
-              <a:rPr lang="ko-KR" sz="1800">
-                <a:latin typeface="맑은 고딕" charset="0"/>
-                <a:ea typeface="맑은 고딕" charset="0"/>
-              </a:rPr>
-              <a:t>s</a:t>
-            </a:r>
-            <a:r>
-              <a:rPr lang="ko-KR" sz="1800">
-                <a:latin typeface="맑은 고딕" charset="0"/>
-                <a:ea typeface="맑은 고딕" charset="0"/>
-              </a:rPr>
-              <a:t>tring)</a:t>
-            </a:r>
-            <a:r>
-              <a:rPr lang="ko-KR" sz="1800">
-                <a:latin typeface="맑은 고딕" charset="0"/>
-                <a:ea typeface="맑은 고딕" charset="0"/>
-              </a:rPr>
-              <a:t> 함수를 </a:t>
-            </a:r>
-            <a:r>
-              <a:rPr lang="ko-KR" sz="1800">
-                <a:latin typeface="맑은 고딕" charset="0"/>
-                <a:ea typeface="맑은 고딕" charset="0"/>
-              </a:rPr>
-              <a:t>호출합니다.</a:t>
+              <a:t>그다음으로 Awake( ) 함수에서 SetMouse(string) 함수를 호출합니다.</a:t>
             </a:r>
             <a:endParaRPr lang="ko-KR" altLang="en-US" sz="1800">
               <a:latin typeface="맑은 고딕" charset="0"/>
@@ -8576,8 +8451,8 @@
         </p:nvSpPr>
         <p:spPr>
           <a:xfrm rot="0">
-            <a:off x="6863715" y="5537200"/>
-            <a:ext cx="4140200" cy="647065"/>
+            <a:off x="6863715" y="3166745"/>
+            <a:ext cx="4104005" cy="647700"/>
           </a:xfrm>
           <a:prstGeom prst="rect"/>
           <a:noFill/>
@@ -8587,7 +8462,7 @@
           </a:ln>
         </p:spPr>
         <p:txBody>
-          <a:bodyPr wrap="square" lIns="89535" tIns="46355" rIns="89535" bIns="46355" vert="horz" anchor="t">
+          <a:bodyPr wrap="square" lIns="89535" tIns="46355" rIns="89535" bIns="46355" numCol="1" vert="horz" anchor="t">
             <a:spAutoFit/>
           </a:bodyPr>
           <a:lstStyle/>
@@ -8604,17 +8479,7 @@
                 <a:latin typeface="맑은 고딕" charset="0"/>
                 <a:ea typeface="맑은 고딕" charset="0"/>
               </a:rPr>
-              <a:t>1</a:t>
-            </a:r>
-            <a:r>
-              <a:rPr lang="ko-KR" sz="1800" b="1">
-                <a:solidFill>
-                  <a:srgbClr val="0611F2"/>
-                </a:solidFill>
-                <a:latin typeface="맑은 고딕" charset="0"/>
-                <a:ea typeface="맑은 고딕" charset="0"/>
-              </a:rPr>
-              <a:t>2</a:t>
+              <a:t>15</a:t>
             </a:r>
             <a:r>
               <a:rPr sz="1800" b="1">
@@ -8631,112 +8496,14 @@
                 <a:latin typeface="맑은 고딕" charset="0"/>
                 <a:ea typeface="맑은 고딕" charset="0"/>
               </a:rPr>
-              <a:t> </a:t>
-            </a:r>
-            <a:r>
-              <a:rPr sz="1800">
-                <a:latin typeface="맑은 고딕" charset="0"/>
-                <a:ea typeface="맑은 고딕" charset="0"/>
-              </a:rPr>
-              <a:t>그</a:t>
-            </a:r>
-            <a:r>
-              <a:rPr lang="ko-KR" sz="1800">
-                <a:latin typeface="맑은 고딕" charset="0"/>
-                <a:ea typeface="맑은 고딕" charset="0"/>
-              </a:rPr>
-              <a:t>런 </a:t>
-            </a:r>
-            <a:r>
-              <a:rPr lang="ko-KR" sz="1800">
-                <a:latin typeface="맑은 고딕" charset="0"/>
-                <a:ea typeface="맑은 고딕" charset="0"/>
-              </a:rPr>
-              <a:t>다음</a:t>
-            </a:r>
-            <a:r>
-              <a:rPr lang="ko-KR" sz="1800">
-                <a:latin typeface="맑은 고딕" charset="0"/>
-                <a:ea typeface="맑은 고딕" charset="0"/>
-              </a:rPr>
-              <a:t> Aw</a:t>
-            </a:r>
-            <a:r>
-              <a:rPr lang="ko-KR" sz="1800">
-                <a:latin typeface="맑은 고딕" charset="0"/>
-                <a:ea typeface="맑은 고딕" charset="0"/>
-              </a:rPr>
-              <a:t>ake(</a:t>
-            </a:r>
-            <a:r>
-              <a:rPr lang="ko-KR" sz="1800">
-                <a:latin typeface="맑은 고딕" charset="0"/>
-                <a:ea typeface="맑은 고딕" charset="0"/>
-              </a:rPr>
-              <a:t> </a:t>
-            </a:r>
-            <a:r>
-              <a:rPr lang="ko-KR" sz="1800">
-                <a:latin typeface="맑은 고딕" charset="0"/>
-                <a:ea typeface="맑은 고딕" charset="0"/>
-              </a:rPr>
-              <a:t>)</a:t>
-            </a:r>
-            <a:r>
-              <a:rPr lang="ko-KR" sz="1800">
-                <a:latin typeface="맑은 고딕" charset="0"/>
-                <a:ea typeface="맑은 고딕" charset="0"/>
-              </a:rPr>
-              <a:t> 함수에서 S</a:t>
-            </a:r>
-            <a:r>
-              <a:rPr lang="ko-KR" sz="1800">
-                <a:latin typeface="맑은 고딕" charset="0"/>
-                <a:ea typeface="맑은 고딕" charset="0"/>
-              </a:rPr>
-              <a:t>etM</a:t>
-            </a:r>
-            <a:r>
-              <a:rPr lang="ko-KR" sz="1800">
-                <a:latin typeface="맑은 고딕" charset="0"/>
-                <a:ea typeface="맑은 고딕" charset="0"/>
-              </a:rPr>
-              <a:t>o</a:t>
-            </a:r>
-            <a:r>
-              <a:rPr lang="ko-KR" sz="1800">
-                <a:latin typeface="맑은 고딕" charset="0"/>
-                <a:ea typeface="맑은 고딕" charset="0"/>
-              </a:rPr>
-              <a:t>use(</a:t>
-            </a:r>
-            <a:r>
-              <a:rPr lang="ko-KR" sz="1800">
-                <a:latin typeface="맑은 고딕" charset="0"/>
-                <a:ea typeface="맑은 고딕" charset="0"/>
-              </a:rPr>
-              <a:t>s</a:t>
-            </a:r>
-            <a:r>
-              <a:rPr lang="ko-KR" sz="1800">
-                <a:latin typeface="맑은 고딕" charset="0"/>
-                <a:ea typeface="맑은 고딕" charset="0"/>
-              </a:rPr>
-              <a:t>tring)</a:t>
-            </a:r>
-            <a:r>
-              <a:rPr lang="ko-KR" sz="1800">
-                <a:latin typeface="맑은 고딕" charset="0"/>
-                <a:ea typeface="맑은 고딕" charset="0"/>
-              </a:rPr>
-              <a:t> 함수를 </a:t>
-            </a:r>
-            <a:r>
-              <a:rPr lang="ko-KR" sz="1800">
-                <a:latin typeface="맑은 고딕" charset="0"/>
-                <a:ea typeface="맑은 고딕" charset="0"/>
-              </a:rPr>
-              <a:t>호출합니다.</a:t>
+              <a:t> 이제</a:t>
+            </a:r>
+            <a:r>
+              <a:rPr lang="ko-KR" sz="1800">
+                <a:latin typeface="맑은 고딕" charset="0"/>
+                <a:ea typeface="맑은 고딕" charset="0"/>
+              </a:rPr>
+              <a:t> OnMouseExit( ) 함수에서 SetMouse(string) 함수를 호출합니다.</a:t>
             </a:r>
             <a:endParaRPr lang="ko-KR" altLang="en-US" sz="1800">
               <a:latin typeface="맑은 고딕" charset="0"/>
@@ -8747,14 +8514,45 @@
       </p:sp>
       <p:pic>
         <p:nvPicPr>
-          <p:cNvPr id="19" name="Picture " descr="C:/Users/nwond/AppData/Roaming/PolarisOffice/ETemp/2436_20910960/fImage199571899961.png"/>
+          <p:cNvPr id="19" name="Picture "/>
           <p:cNvPicPr>
             <a:picLocks noChangeAspect="1"/>
           </p:cNvPicPr>
           <p:nvPr/>
         </p:nvPicPr>
         <p:blipFill rotWithShape="1">
-          <a:blip r:embed="rId2" cstate="print">
+          <a:blip r:embed="rId2" cstate="hqprint">
+            <a:extLst>
+              <a:ext uri="{28A0092B-C50C-407E-A947-70E740481C1C}">
+                <a14:useLocalDpi xmlns:a14="http://schemas.microsoft.com/office/drawing/2010/main"/>
+              </a:ext>
+            </a:extLst>
+          </a:blip>
+          <a:stretch>
+            <a:fillRect/>
+          </a:stretch>
+        </p:blipFill>
+        <p:spPr>
+          <a:xfrm rot="0">
+            <a:off x="1247775" y="1446530"/>
+            <a:ext cx="4134485" cy="1334770"/>
+          </a:xfrm>
+          <a:prstGeom prst="roundRect"/>
+          <a:solidFill>
+            <a:srgbClr val="EDEDED"/>
+          </a:solidFill>
+        </p:spPr>
+      </p:pic>
+      <p:pic>
+        <p:nvPicPr>
+          <p:cNvPr id="20" name="그림 1"/>
+          <p:cNvPicPr>
+            <a:picLocks noChangeAspect="1"/>
+          </p:cNvPicPr>
+          <p:nvPr/>
+        </p:nvPicPr>
+        <p:blipFill rotWithShape="1">
+          <a:blip r:embed="rId3" cstate="print">
             <a:extLst>
               <a:ext uri="{28A0092B-C50C-407E-A947-70E740481C1C}">
                 <a14:useLocalDpi xmlns:a14="http://schemas.microsoft.com/office/drawing/2010/main" val="0"/>
@@ -8767,8 +8565,8 @@
         </p:blipFill>
         <p:spPr>
           <a:xfrm rot="0">
-            <a:off x="1247775" y="1446530"/>
-            <a:ext cx="4133850" cy="1117600"/>
+            <a:off x="1246505" y="3680460"/>
+            <a:ext cx="4134485" cy="1472565"/>
           </a:xfrm>
           <a:prstGeom prst="roundRect"/>
           <a:solidFill>
@@ -8776,6 +8574,345 @@
           </a:solidFill>
         </p:spPr>
       </p:pic>
+      <p:sp>
+        <p:nvSpPr>
+          <p:cNvPr id="21" name="텍스트 상자 4"/>
+          <p:cNvSpPr txBox="1">
+            <a:spLocks/>
+          </p:cNvSpPr>
+          <p:nvPr/>
+        </p:nvSpPr>
+        <p:spPr>
+          <a:xfrm rot="0">
+            <a:off x="1244600" y="5255260"/>
+            <a:ext cx="4140835" cy="923925"/>
+          </a:xfrm>
+          <a:prstGeom prst="rect"/>
+          <a:noFill/>
+          <a:ln w="0">
+            <a:noFill/>
+            <a:prstDash/>
+          </a:ln>
+        </p:spPr>
+        <p:txBody>
+          <a:bodyPr wrap="square" lIns="89535" tIns="46355" rIns="89535" bIns="46355" numCol="1" vert="horz" anchor="t">
+            <a:spAutoFit/>
+          </a:bodyPr>
+          <a:lstStyle/>
+          <a:p>
+            <a:pPr marL="0" indent="0" rtl="0" algn="l" defTabSz="914400" eaLnBrk="1" latinLnBrk="0" hangingPunct="1">
+              <a:buFontTx/>
+              <a:buNone/>
+            </a:pPr>
+            <a:r>
+              <a:rPr lang="ko-KR" sz="1800" b="1">
+                <a:solidFill>
+                  <a:srgbClr val="0611F2"/>
+                </a:solidFill>
+                <a:latin typeface="맑은 고딕" charset="0"/>
+                <a:ea typeface="맑은 고딕" charset="0"/>
+              </a:rPr>
+              <a:t>1</a:t>
+            </a:r>
+            <a:r>
+              <a:rPr lang="ko-KR" sz="1800" b="1">
+                <a:solidFill>
+                  <a:srgbClr val="0611F2"/>
+                </a:solidFill>
+                <a:latin typeface="맑은 고딕" charset="0"/>
+                <a:ea typeface="맑은 고딕" charset="0"/>
+              </a:rPr>
+              <a:t>4</a:t>
+            </a:r>
+            <a:r>
+              <a:rPr lang="ko-KR" sz="1800" b="1">
+                <a:solidFill>
+                  <a:srgbClr val="0611F2"/>
+                </a:solidFill>
+                <a:latin typeface="맑은 고딕" charset="0"/>
+                <a:ea typeface="맑은 고딕" charset="0"/>
+              </a:rPr>
+              <a:t>.</a:t>
+            </a:r>
+            <a:r>
+              <a:rPr sz="1800">
+                <a:latin typeface="맑은 고딕" charset="0"/>
+                <a:ea typeface="맑은 고딕" charset="0"/>
+              </a:rPr>
+              <a:t> 그</a:t>
+            </a:r>
+            <a:r>
+              <a:rPr lang="ko-KR" sz="1800">
+                <a:latin typeface="맑은 고딕" charset="0"/>
+                <a:ea typeface="맑은 고딕" charset="0"/>
+              </a:rPr>
+              <a:t>러고 </a:t>
+            </a:r>
+            <a:r>
+              <a:rPr lang="ko-KR" sz="1800">
+                <a:latin typeface="맑은 고딕" charset="0"/>
+                <a:ea typeface="맑은 고딕" charset="0"/>
+              </a:rPr>
+              <a:t>나서</a:t>
+            </a:r>
+            <a:r>
+              <a:rPr lang="ko-KR" sz="1800">
+                <a:latin typeface="맑은 고딕" charset="0"/>
+                <a:ea typeface="맑은 고딕" charset="0"/>
+              </a:rPr>
+              <a:t> </a:t>
+            </a:r>
+            <a:r>
+              <a:rPr lang="ko-KR" sz="1800">
+                <a:latin typeface="맑은 고딕" charset="0"/>
+                <a:ea typeface="맑은 고딕" charset="0"/>
+              </a:rPr>
+              <a:t>O</a:t>
+            </a:r>
+            <a:r>
+              <a:rPr lang="ko-KR" sz="1800">
+                <a:latin typeface="맑은 고딕" charset="0"/>
+                <a:ea typeface="맑은 고딕" charset="0"/>
+              </a:rPr>
+              <a:t>nMouser</a:t>
+            </a:r>
+            <a:r>
+              <a:rPr lang="ko-KR" sz="1800">
+                <a:latin typeface="맑은 고딕" charset="0"/>
+                <a:ea typeface="맑은 고딕" charset="0"/>
+              </a:rPr>
+              <a:t>E</a:t>
+            </a:r>
+            <a:r>
+              <a:rPr lang="ko-KR" sz="1800">
+                <a:latin typeface="맑은 고딕" charset="0"/>
+                <a:ea typeface="맑은 고딕" charset="0"/>
+              </a:rPr>
+              <a:t>nter</a:t>
+            </a:r>
+            <a:r>
+              <a:rPr lang="ko-KR" sz="1800">
+                <a:latin typeface="맑은 고딕" charset="0"/>
+                <a:ea typeface="맑은 고딕" charset="0"/>
+              </a:rPr>
+              <a:t>( ) 함수에서 SetMouse(string) 함수를 호출합니다.</a:t>
+            </a:r>
+            <a:endParaRPr lang="ko-KR" altLang="en-US" sz="1800">
+              <a:latin typeface="맑은 고딕" charset="0"/>
+              <a:ea typeface="맑은 고딕" charset="0"/>
+            </a:endParaRPr>
+          </a:p>
+        </p:txBody>
+      </p:sp>
+      <p:pic>
+        <p:nvPicPr>
+          <p:cNvPr id="22" name="그림 5" descr="C:/Users/nwond/AppData/Roaming/PolarisOffice/ETemp/17660_9042720/fImage30293788467.png"/>
+          <p:cNvPicPr>
+            <a:picLocks noChangeAspect="1"/>
+          </p:cNvPicPr>
+          <p:nvPr/>
+        </p:nvPicPr>
+        <p:blipFill rotWithShape="1">
+          <a:blip r:embed="rId4" cstate="hqprint">
+            <a:extLst>
+              <a:ext uri="{28A0092B-C50C-407E-A947-70E740481C1C}">
+                <a14:useLocalDpi xmlns:a14="http://schemas.microsoft.com/office/drawing/2010/main"/>
+              </a:ext>
+            </a:extLst>
+          </a:blip>
+          <a:stretch>
+            <a:fillRect/>
+          </a:stretch>
+        </p:blipFill>
+        <p:spPr>
+          <a:xfrm rot="0">
+            <a:off x="6861810" y="1446530"/>
+            <a:ext cx="4099560" cy="1614170"/>
+          </a:xfrm>
+          <a:prstGeom prst="roundRect"/>
+          <a:solidFill>
+            <a:srgbClr val="EDEDED"/>
+          </a:solidFill>
+        </p:spPr>
+      </p:pic>
+      <p:pic>
+        <p:nvPicPr>
+          <p:cNvPr id="23" name="그림 1" descr="C:/Users/nwond/AppData/Roaming/PolarisOffice/ETemp/17660_9042720/fImage46367941.png"/>
+          <p:cNvPicPr>
+            <a:picLocks noChangeAspect="1"/>
+          </p:cNvPicPr>
+          <p:nvPr/>
+        </p:nvPicPr>
+        <p:blipFill rotWithShape="1">
+          <a:blip r:embed="rId5" cstate="hqprint">
+            <a:extLst>
+              <a:ext uri="{28A0092B-C50C-407E-A947-70E740481C1C}">
+                <a14:useLocalDpi xmlns:a14="http://schemas.microsoft.com/office/drawing/2010/main"/>
+              </a:ext>
+            </a:extLst>
+          </a:blip>
+          <a:stretch>
+            <a:fillRect/>
+          </a:stretch>
+        </p:blipFill>
+        <p:spPr>
+          <a:xfrm rot="0">
+            <a:off x="8812530" y="3978910"/>
+            <a:ext cx="2153920" cy="1397000"/>
+          </a:xfrm>
+          <a:prstGeom prst="roundRect"/>
+          <a:solidFill>
+            <a:srgbClr val="EDEDED"/>
+          </a:solidFill>
+        </p:spPr>
+      </p:pic>
+      <p:pic>
+        <p:nvPicPr>
+          <p:cNvPr id="24" name="그림 2" descr="C:/Users/nwond/AppData/Roaming/PolarisOffice/ETemp/17660_9042720/fImage6818808467.png"/>
+          <p:cNvPicPr>
+            <a:picLocks noChangeAspect="1"/>
+          </p:cNvPicPr>
+          <p:nvPr/>
+        </p:nvPicPr>
+        <p:blipFill rotWithShape="1">
+          <a:blip r:embed="rId6" cstate="print">
+            <a:extLst>
+              <a:ext uri="{28A0092B-C50C-407E-A947-70E740481C1C}">
+                <a14:useLocalDpi xmlns:a14="http://schemas.microsoft.com/office/drawing/2010/main" val="0"/>
+              </a:ext>
+            </a:extLst>
+          </a:blip>
+          <a:stretch>
+            <a:fillRect/>
+          </a:stretch>
+        </p:blipFill>
+        <p:spPr>
+          <a:xfrm rot="0">
+            <a:off x="6855460" y="3978910"/>
+            <a:ext cx="1814830" cy="1395095"/>
+          </a:xfrm>
+          <a:prstGeom prst="roundRect"/>
+          <a:solidFill>
+            <a:srgbClr val="EDEDED"/>
+          </a:solidFill>
+        </p:spPr>
+      </p:pic>
+      <p:sp>
+        <p:nvSpPr>
+          <p:cNvPr id="25" name="텍스트 상자 5"/>
+          <p:cNvSpPr txBox="1">
+            <a:spLocks/>
+          </p:cNvSpPr>
+          <p:nvPr/>
+        </p:nvSpPr>
+        <p:spPr>
+          <a:xfrm rot="0">
+            <a:off x="6861175" y="5528310"/>
+            <a:ext cx="4104005" cy="647065"/>
+          </a:xfrm>
+          <a:prstGeom prst="rect"/>
+          <a:noFill/>
+          <a:ln w="0">
+            <a:noFill/>
+            <a:prstDash/>
+          </a:ln>
+        </p:spPr>
+        <p:txBody>
+          <a:bodyPr wrap="square" lIns="89535" tIns="46355" rIns="89535" bIns="46355" numCol="1" vert="horz" anchor="t">
+            <a:spAutoFit/>
+          </a:bodyPr>
+          <a:lstStyle/>
+          <a:p>
+            <a:pPr marL="0" indent="0" rtl="0" algn="l" defTabSz="914400" eaLnBrk="1" latinLnBrk="0" hangingPunct="1">
+              <a:buFontTx/>
+              <a:buNone/>
+            </a:pPr>
+            <a:r>
+              <a:rPr lang="ko-KR" sz="1800" b="1">
+                <a:solidFill>
+                  <a:srgbClr val="0611F2"/>
+                </a:solidFill>
+                <a:latin typeface="맑은 고딕" charset="0"/>
+                <a:ea typeface="맑은 고딕" charset="0"/>
+              </a:rPr>
+              <a:t>1</a:t>
+            </a:r>
+            <a:r>
+              <a:rPr lang="ko-KR" sz="1800" b="1">
+                <a:solidFill>
+                  <a:srgbClr val="0611F2"/>
+                </a:solidFill>
+                <a:latin typeface="맑은 고딕" charset="0"/>
+                <a:ea typeface="맑은 고딕" charset="0"/>
+              </a:rPr>
+              <a:t>6</a:t>
+            </a:r>
+            <a:r>
+              <a:rPr sz="1800" b="1">
+                <a:solidFill>
+                  <a:srgbClr val="0611F2"/>
+                </a:solidFill>
+                <a:latin typeface="맑은 고딕" charset="0"/>
+                <a:ea typeface="맑은 고딕" charset="0"/>
+              </a:rPr>
+              <a:t>.</a:t>
+            </a:r>
+            <a:r>
+              <a:rPr sz="1800">
+                <a:latin typeface="맑은 고딕" charset="0"/>
+                <a:ea typeface="맑은 고딕" charset="0"/>
+              </a:rPr>
+              <a:t> </a:t>
+            </a:r>
+            <a:r>
+              <a:rPr lang="ko-KR" sz="1800">
+                <a:latin typeface="맑은 고딕" charset="0"/>
+                <a:ea typeface="맑은 고딕" charset="0"/>
+              </a:rPr>
+              <a:t>그리고 </a:t>
+            </a:r>
+            <a:r>
+              <a:rPr lang="ko-KR" sz="1800">
+                <a:latin typeface="맑은 고딕" charset="0"/>
+                <a:ea typeface="맑은 고딕" charset="0"/>
+              </a:rPr>
+              <a:t>월드 </a:t>
+            </a:r>
+            <a:r>
+              <a:rPr lang="ko-KR" sz="1800">
+                <a:latin typeface="맑은 고딕" charset="0"/>
+                <a:ea typeface="맑은 고딕" charset="0"/>
+              </a:rPr>
+              <a:t>공간에 </a:t>
+            </a:r>
+            <a:r>
+              <a:rPr lang="ko-KR" sz="1800">
+                <a:latin typeface="맑은 고딕" charset="0"/>
+                <a:ea typeface="맑은 고딕" charset="0"/>
+              </a:rPr>
+              <a:t>있는 Prefab Object를 </a:t>
+            </a:r>
+            <a:r>
+              <a:rPr lang="ko-KR" sz="1800">
+                <a:latin typeface="맑은 고딕" charset="0"/>
+                <a:ea typeface="맑은 고딕" charset="0"/>
+              </a:rPr>
+              <a:t>삭제합니다.</a:t>
+            </a:r>
+            <a:r>
+              <a:rPr lang="ko-KR" sz="1800">
+                <a:latin typeface="맑은 고딕" charset="0"/>
+                <a:ea typeface="맑은 고딕" charset="0"/>
+              </a:rPr>
+              <a:t> </a:t>
+            </a:r>
+            <a:endParaRPr lang="ko-KR" altLang="en-US" sz="1800">
+              <a:latin typeface="맑은 고딕" charset="0"/>
+              <a:ea typeface="맑은 고딕" charset="0"/>
+            </a:endParaRPr>
+          </a:p>
+        </p:txBody>
+      </p:sp>
     </p:spTree>
   </p:cSld>
   <p:clrMapOvr>

</xml_diff>